<commit_message>
fixed presentation of thesis
</commit_message>
<xml_diff>
--- a/documentation/диплом.pptx
+++ b/documentation/диплом.pptx
@@ -261,7 +261,7 @@
             <a:fld id="{62554B6E-4CC4-4D25-B40F-F3D129394E93}" type="datetimeFigureOut">
               <a:rPr lang="ru-RU" smtClean="0"/>
               <a:pPr/>
-              <a:t>22.03.2021</a:t>
+              <a:t>23.03.2021</a:t>
             </a:fld>
             <a:endParaRPr lang="ru-RU"/>
           </a:p>
@@ -576,7 +576,7 @@
             <a:fld id="{62554B6E-4CC4-4D25-B40F-F3D129394E93}" type="datetimeFigureOut">
               <a:rPr lang="ru-RU" smtClean="0"/>
               <a:pPr/>
-              <a:t>22.03.2021</a:t>
+              <a:t>23.03.2021</a:t>
             </a:fld>
             <a:endParaRPr lang="ru-RU"/>
           </a:p>
@@ -763,7 +763,7 @@
             <a:fld id="{62554B6E-4CC4-4D25-B40F-F3D129394E93}" type="datetimeFigureOut">
               <a:rPr lang="ru-RU" smtClean="0"/>
               <a:pPr/>
-              <a:t>22.03.2021</a:t>
+              <a:t>23.03.2021</a:t>
             </a:fld>
             <a:endParaRPr lang="ru-RU"/>
           </a:p>
@@ -940,7 +940,7 @@
             <a:fld id="{62554B6E-4CC4-4D25-B40F-F3D129394E93}" type="datetimeFigureOut">
               <a:rPr lang="ru-RU" smtClean="0"/>
               <a:pPr/>
-              <a:t>22.03.2021</a:t>
+              <a:t>23.03.2021</a:t>
             </a:fld>
             <a:endParaRPr lang="ru-RU"/>
           </a:p>
@@ -1210,7 +1210,7 @@
             <a:fld id="{62554B6E-4CC4-4D25-B40F-F3D129394E93}" type="datetimeFigureOut">
               <a:rPr lang="ru-RU" smtClean="0"/>
               <a:pPr/>
-              <a:t>22.03.2021</a:t>
+              <a:t>23.03.2021</a:t>
             </a:fld>
             <a:endParaRPr lang="ru-RU"/>
           </a:p>
@@ -1680,7 +1680,7 @@
             <a:fld id="{62554B6E-4CC4-4D25-B40F-F3D129394E93}" type="datetimeFigureOut">
               <a:rPr lang="ru-RU" smtClean="0"/>
               <a:pPr/>
-              <a:t>22.03.2021</a:t>
+              <a:t>23.03.2021</a:t>
             </a:fld>
             <a:endParaRPr lang="ru-RU"/>
           </a:p>
@@ -2171,7 +2171,7 @@
             <a:fld id="{62554B6E-4CC4-4D25-B40F-F3D129394E93}" type="datetimeFigureOut">
               <a:rPr lang="ru-RU" smtClean="0"/>
               <a:pPr/>
-              <a:t>22.03.2021</a:t>
+              <a:t>23.03.2021</a:t>
             </a:fld>
             <a:endParaRPr lang="ru-RU"/>
           </a:p>
@@ -2299,7 +2299,7 @@
             <a:fld id="{62554B6E-4CC4-4D25-B40F-F3D129394E93}" type="datetimeFigureOut">
               <a:rPr lang="ru-RU" smtClean="0"/>
               <a:pPr/>
-              <a:t>22.03.2021</a:t>
+              <a:t>23.03.2021</a:t>
             </a:fld>
             <a:endParaRPr lang="ru-RU"/>
           </a:p>
@@ -2445,7 +2445,7 @@
             <a:fld id="{62554B6E-4CC4-4D25-B40F-F3D129394E93}" type="datetimeFigureOut">
               <a:rPr lang="ru-RU" smtClean="0"/>
               <a:pPr/>
-              <a:t>22.03.2021</a:t>
+              <a:t>23.03.2021</a:t>
             </a:fld>
             <a:endParaRPr lang="ru-RU"/>
           </a:p>
@@ -2769,7 +2769,7 @@
             <a:fld id="{62554B6E-4CC4-4D25-B40F-F3D129394E93}" type="datetimeFigureOut">
               <a:rPr lang="ru-RU" smtClean="0"/>
               <a:pPr/>
-              <a:t>22.03.2021</a:t>
+              <a:t>23.03.2021</a:t>
             </a:fld>
             <a:endParaRPr lang="ru-RU"/>
           </a:p>
@@ -2905,7 +2905,7 @@
             <a:fld id="{62554B6E-4CC4-4D25-B40F-F3D129394E93}" type="datetimeFigureOut">
               <a:rPr lang="ru-RU" smtClean="0"/>
               <a:pPr/>
-              <a:t>22.03.2021</a:t>
+              <a:t>23.03.2021</a:t>
             </a:fld>
             <a:endParaRPr lang="ru-RU"/>
           </a:p>
@@ -3688,7 +3688,7 @@
             <a:fld id="{62554B6E-4CC4-4D25-B40F-F3D129394E93}" type="datetimeFigureOut">
               <a:rPr lang="ru-RU" smtClean="0"/>
               <a:pPr/>
-              <a:t>22.03.2021</a:t>
+              <a:t>23.03.2021</a:t>
             </a:fld>
             <a:endParaRPr lang="ru-RU"/>
           </a:p>
@@ -4426,11 +4426,7 @@
             </a:r>
             <a:r>
               <a:rPr lang="ru-RU" dirty="0" smtClean="0"/>
-              <a:t> происходит на странице не вовремя вызова </a:t>
-            </a:r>
-            <a:r>
-              <a:rPr lang="ru-RU" dirty="0" smtClean="0"/>
-              <a:t>метода </a:t>
+              <a:t> происходит на странице не вовремя вызова метода </a:t>
             </a:r>
             <a:r>
               <a:rPr lang="ru-RU" dirty="0" err="1" smtClean="0"/>
@@ -4446,19 +4442,7 @@
             </a:r>
             <a:r>
               <a:rPr lang="ru-RU" dirty="0" smtClean="0"/>
-              <a:t> использует, так называемую, LAZY инициализацию. То есть, поиск элемента будет осуществляться только при обращении к нему в ходе выполнения теста. Если </a:t>
-            </a:r>
-            <a:r>
-              <a:rPr lang="ru-RU" dirty="0" smtClean="0"/>
-              <a:t>элемент никогда </a:t>
-            </a:r>
-            <a:r>
-              <a:rPr lang="ru-RU" dirty="0" smtClean="0"/>
-              <a:t>не </a:t>
-            </a:r>
-            <a:r>
-              <a:rPr lang="ru-RU" dirty="0" smtClean="0"/>
-              <a:t>используется в </a:t>
+              <a:t> использует, так называемую, LAZY инициализацию. То есть, поиск элемента будет осуществляться только при обращении к нему в ходе выполнения теста. Если элемент никогда не используется в </a:t>
             </a:r>
             <a:r>
               <a:rPr lang="ru-RU" dirty="0" err="1" smtClean="0"/>
@@ -4761,19 +4745,7 @@
             </a:pPr>
             <a:r>
               <a:rPr lang="ru-RU" dirty="0" smtClean="0"/>
-              <a:t>Проверка наличия </a:t>
-            </a:r>
-            <a:r>
-              <a:rPr lang="ru-RU" dirty="0" smtClean="0"/>
-              <a:t>кнопок </a:t>
-            </a:r>
-            <a:r>
-              <a:rPr lang="ru-RU" dirty="0" smtClean="0"/>
-              <a:t>«войти» и </a:t>
-            </a:r>
-            <a:r>
-              <a:rPr lang="ru-RU" dirty="0" smtClean="0"/>
-              <a:t>«создать резюме»</a:t>
+              <a:t>Проверка наличия кнопок «войти» и «создать резюме»</a:t>
             </a:r>
           </a:p>
           <a:p>
@@ -4783,15 +4755,7 @@
             </a:pPr>
             <a:r>
               <a:rPr lang="ru-RU" dirty="0" smtClean="0"/>
-              <a:t>Проверка заголовка </a:t>
-            </a:r>
-            <a:r>
-              <a:rPr lang="ru-RU" dirty="0" smtClean="0"/>
-              <a:t>кнопки </a:t>
-            </a:r>
-            <a:r>
-              <a:rPr lang="ru-RU" dirty="0" smtClean="0"/>
-              <a:t>«создать резюме» (для работодателя данная кнопка будет называться «разместить вакансию»)</a:t>
+              <a:t>Проверка заголовка кнопки «создать резюме» (для работодателя данная кнопка будет называться «разместить вакансию»)</a:t>
             </a:r>
           </a:p>
           <a:p>
@@ -4801,13 +4765,8 @@
             </a:pPr>
             <a:r>
               <a:rPr lang="ru-RU" dirty="0" smtClean="0"/>
-              <a:t>Проверка </a:t>
-            </a:r>
-            <a:r>
-              <a:rPr lang="ru-RU" dirty="0" smtClean="0"/>
-              <a:t>переключения видимости панели поиска</a:t>
-            </a:r>
-            <a:endParaRPr lang="ru-RU" dirty="0" smtClean="0"/>
+              <a:t>Проверка переключения видимости панели поиска</a:t>
+            </a:r>
           </a:p>
           <a:p>
             <a:endParaRPr lang="ru-RU" dirty="0"/>
@@ -4875,11 +4834,7 @@
             </a:pPr>
             <a:r>
               <a:rPr lang="ru-RU" dirty="0" smtClean="0"/>
-              <a:t>Проверка </a:t>
-            </a:r>
-            <a:r>
-              <a:rPr lang="ru-RU" dirty="0" smtClean="0"/>
-              <a:t>переключения языков на сайте</a:t>
+              <a:t>Проверка переключения языков на сайте</a:t>
             </a:r>
             <a:endParaRPr lang="ru-RU" dirty="0"/>
           </a:p>
@@ -5035,11 +4990,7 @@
           <a:p>
             <a:r>
               <a:rPr lang="ru-RU" dirty="0" smtClean="0"/>
-              <a:t>Проверки для «соискателя</a:t>
-            </a:r>
-            <a:r>
-              <a:rPr lang="ru-RU" dirty="0" smtClean="0"/>
-              <a:t>»</a:t>
+              <a:t>Проверки для «соискателя»</a:t>
             </a:r>
           </a:p>
           <a:p>
@@ -5049,22 +5000,14 @@
             </a:pPr>
             <a:r>
               <a:rPr lang="ru-RU" dirty="0" smtClean="0"/>
-              <a:t>П</a:t>
-            </a:r>
-            <a:r>
-              <a:rPr lang="ru-RU" dirty="0" smtClean="0"/>
-              <a:t>роверка </a:t>
-            </a:r>
-            <a:r>
-              <a:rPr lang="ru-RU" dirty="0" smtClean="0"/>
-              <a:t>количество найденных вакансий</a:t>
+              <a:t>Проверка количество найденных вакансий</a:t>
             </a:r>
           </a:p>
         </p:txBody>
       </p:sp>
       <p:pic>
         <p:nvPicPr>
-          <p:cNvPr id="3074" name="Picture 2"/>
+          <p:cNvPr id="3075" name="Picture 3"/>
           <p:cNvPicPr>
             <a:picLocks noChangeAspect="1" noChangeArrowheads="1"/>
           </p:cNvPicPr>
@@ -5079,8 +5022,8 @@
         </p:blipFill>
         <p:spPr bwMode="auto">
           <a:xfrm>
-            <a:off x="1785918" y="1928802"/>
-            <a:ext cx="5967424" cy="1938756"/>
+            <a:off x="1500166" y="4143380"/>
+            <a:ext cx="6838950" cy="1530350"/>
           </a:xfrm>
           <a:prstGeom prst="rect">
             <a:avLst/>
@@ -5097,7 +5040,7 @@
       </p:pic>
       <p:pic>
         <p:nvPicPr>
-          <p:cNvPr id="3075" name="Picture 3"/>
+          <p:cNvPr id="1026" name="Picture 2"/>
           <p:cNvPicPr>
             <a:picLocks noChangeAspect="1" noChangeArrowheads="1"/>
           </p:cNvPicPr>
@@ -5112,8 +5055,8 @@
         </p:blipFill>
         <p:spPr bwMode="auto">
           <a:xfrm>
-            <a:off x="1500166" y="4143380"/>
-            <a:ext cx="6838950" cy="1530350"/>
+            <a:off x="1428728" y="2000240"/>
+            <a:ext cx="7031935" cy="2000264"/>
           </a:xfrm>
           <a:prstGeom prst="rect">
             <a:avLst/>
@@ -5219,9 +5162,84 @@
           <a:effectLst/>
         </p:spPr>
       </p:pic>
+      <p:sp>
+        <p:nvSpPr>
+          <p:cNvPr id="5" name="TextBox 4"/>
+          <p:cNvSpPr txBox="1"/>
+          <p:nvPr/>
+        </p:nvSpPr>
+        <p:spPr>
+          <a:xfrm>
+            <a:off x="1071538" y="642918"/>
+            <a:ext cx="3583032" cy="646331"/>
+          </a:xfrm>
+          <a:prstGeom prst="rect">
+            <a:avLst/>
+          </a:prstGeom>
+          <a:noFill/>
+        </p:spPr>
+        <p:txBody>
+          <a:bodyPr wrap="none" rtlCol="0">
+            <a:spAutoFit/>
+          </a:bodyPr>
+          <a:lstStyle/>
+          <a:p>
+            <a:pPr>
+              <a:buFont typeface="Wingdings" pitchFamily="2" charset="2"/>
+              <a:buChar char="Ø"/>
+            </a:pPr>
+            <a:r>
+              <a:rPr lang="ru-RU" dirty="0" smtClean="0"/>
+              <a:t>Проверка расширенного поиска</a:t>
+            </a:r>
+          </a:p>
+          <a:p>
+            <a:pPr>
+              <a:buFont typeface="Wingdings" pitchFamily="2" charset="2"/>
+              <a:buChar char="Ø"/>
+            </a:pPr>
+            <a:endParaRPr lang="ru-RU" dirty="0"/>
+          </a:p>
+        </p:txBody>
+      </p:sp>
+      <p:sp>
+        <p:nvSpPr>
+          <p:cNvPr id="7" name="Заголовок 1"/>
+          <p:cNvSpPr>
+            <a:spLocks noGrp="1"/>
+          </p:cNvSpPr>
+          <p:nvPr>
+            <p:ph type="ctrTitle"/>
+          </p:nvPr>
+        </p:nvSpPr>
+        <p:spPr>
+          <a:xfrm>
+            <a:off x="1071538" y="0"/>
+            <a:ext cx="7406640" cy="642942"/>
+          </a:xfrm>
+        </p:spPr>
+        <p:txBody>
+          <a:bodyPr>
+            <a:normAutofit fontScale="90000"/>
+          </a:bodyPr>
+          <a:lstStyle/>
+          <a:p>
+            <a:pPr algn="ctr"/>
+            <a:r>
+              <a:rPr lang="ru-RU" dirty="0" smtClean="0"/>
+              <a:t>Тестирование с помощью </a:t>
+            </a:r>
+            <a:r>
+              <a:rPr lang="en-US" dirty="0" smtClean="0"/>
+              <a:t>API</a:t>
+            </a:r>
+            <a:endParaRPr lang="ru-RU" dirty="0"/>
+          </a:p>
+        </p:txBody>
+      </p:sp>
       <p:pic>
         <p:nvPicPr>
-          <p:cNvPr id="4100" name="Picture 4"/>
+          <p:cNvPr id="2050" name="Picture 2"/>
           <p:cNvPicPr>
             <a:picLocks noChangeAspect="1" noChangeArrowheads="1"/>
           </p:cNvPicPr>
@@ -5236,8 +5254,8 @@
         </p:blipFill>
         <p:spPr bwMode="auto">
           <a:xfrm>
-            <a:off x="1071538" y="5072074"/>
-            <a:ext cx="5857916" cy="1592787"/>
+            <a:off x="1071538" y="5143512"/>
+            <a:ext cx="6924694" cy="1571636"/>
           </a:xfrm>
           <a:prstGeom prst="rect">
             <a:avLst/>
@@ -5252,81 +5270,6 @@
           <a:effectLst/>
         </p:spPr>
       </p:pic>
-      <p:sp>
-        <p:nvSpPr>
-          <p:cNvPr id="5" name="TextBox 4"/>
-          <p:cNvSpPr txBox="1"/>
-          <p:nvPr/>
-        </p:nvSpPr>
-        <p:spPr>
-          <a:xfrm>
-            <a:off x="1071538" y="642918"/>
-            <a:ext cx="3583032" cy="646331"/>
-          </a:xfrm>
-          <a:prstGeom prst="rect">
-            <a:avLst/>
-          </a:prstGeom>
-          <a:noFill/>
-        </p:spPr>
-        <p:txBody>
-          <a:bodyPr wrap="none" rtlCol="0">
-            <a:spAutoFit/>
-          </a:bodyPr>
-          <a:lstStyle/>
-          <a:p>
-            <a:pPr>
-              <a:buFont typeface="Wingdings" pitchFamily="2" charset="2"/>
-              <a:buChar char="Ø"/>
-            </a:pPr>
-            <a:r>
-              <a:rPr lang="ru-RU" dirty="0" smtClean="0"/>
-              <a:t>Проверка расширенного поиска</a:t>
-            </a:r>
-          </a:p>
-          <a:p>
-            <a:pPr>
-              <a:buFont typeface="Wingdings" pitchFamily="2" charset="2"/>
-              <a:buChar char="Ø"/>
-            </a:pPr>
-            <a:endParaRPr lang="ru-RU" dirty="0"/>
-          </a:p>
-        </p:txBody>
-      </p:sp>
-      <p:sp>
-        <p:nvSpPr>
-          <p:cNvPr id="7" name="Заголовок 1"/>
-          <p:cNvSpPr>
-            <a:spLocks noGrp="1"/>
-          </p:cNvSpPr>
-          <p:nvPr>
-            <p:ph type="ctrTitle"/>
-          </p:nvPr>
-        </p:nvSpPr>
-        <p:spPr>
-          <a:xfrm>
-            <a:off x="1071538" y="0"/>
-            <a:ext cx="7406640" cy="642942"/>
-          </a:xfrm>
-        </p:spPr>
-        <p:txBody>
-          <a:bodyPr>
-            <a:normAutofit fontScale="90000"/>
-          </a:bodyPr>
-          <a:lstStyle/>
-          <a:p>
-            <a:pPr algn="ctr"/>
-            <a:r>
-              <a:rPr lang="ru-RU" dirty="0" smtClean="0"/>
-              <a:t>Тестирование с помощью </a:t>
-            </a:r>
-            <a:r>
-              <a:rPr lang="en-US" dirty="0" smtClean="0"/>
-              <a:t>API</a:t>
-            </a:r>
-            <a:endParaRPr lang="ru-RU" dirty="0"/>
-          </a:p>
-        </p:txBody>
-      </p:sp>
     </p:spTree>
   </p:cSld>
   <p:clrMapOvr>
@@ -5380,15 +5323,7 @@
             </a:pPr>
             <a:r>
               <a:rPr lang="ru-RU" dirty="0" smtClean="0"/>
-              <a:t>П</a:t>
-            </a:r>
-            <a:r>
-              <a:rPr lang="ru-RU" dirty="0" smtClean="0"/>
-              <a:t>роверка </a:t>
-            </a:r>
-            <a:r>
-              <a:rPr lang="ru-RU" dirty="0" smtClean="0"/>
-              <a:t>одной вакансии</a:t>
+              <a:t>Проверка одной вакансии</a:t>
             </a:r>
             <a:endParaRPr lang="ru-RU" dirty="0"/>
           </a:p>
@@ -5497,7 +5432,7 @@
       </p:pic>
       <p:pic>
         <p:nvPicPr>
-          <p:cNvPr id="5124" name="Picture 4"/>
+          <p:cNvPr id="3074" name="Picture 2"/>
           <p:cNvPicPr>
             <a:picLocks noChangeAspect="1" noChangeArrowheads="1"/>
           </p:cNvPicPr>
@@ -5512,8 +5447,8 @@
         </p:blipFill>
         <p:spPr bwMode="auto">
           <a:xfrm>
-            <a:off x="4987233" y="3357562"/>
-            <a:ext cx="4016581" cy="3295656"/>
+            <a:off x="5143504" y="3857628"/>
+            <a:ext cx="3857652" cy="2813411"/>
           </a:xfrm>
           <a:prstGeom prst="rect">
             <a:avLst/>
@@ -5577,13 +5512,8 @@
           <a:p>
             <a:r>
               <a:rPr lang="ru-RU" dirty="0" smtClean="0"/>
-              <a:t>Проверки для </a:t>
-            </a:r>
-            <a:r>
-              <a:rPr lang="ru-RU" dirty="0" smtClean="0"/>
-              <a:t>«работодателя»</a:t>
-            </a:r>
-            <a:endParaRPr lang="ru-RU" dirty="0" smtClean="0"/>
+              <a:t>Проверки для «работодателя»</a:t>
+            </a:r>
           </a:p>
           <a:p>
             <a:pPr>
@@ -5592,15 +5522,7 @@
             </a:pPr>
             <a:r>
               <a:rPr lang="ru-RU" dirty="0" smtClean="0"/>
-              <a:t>Поиск по </a:t>
-            </a:r>
-            <a:r>
-              <a:rPr lang="ru-RU" dirty="0" smtClean="0"/>
-              <a:t>тексту количества компаний</a:t>
-            </a:r>
-            <a:r>
-              <a:rPr lang="ru-RU" dirty="0" smtClean="0"/>
-              <a:t>, у которых нет открытых вакансий</a:t>
+              <a:t>Поиск по тексту количества компаний, у которых нет открытых вакансий</a:t>
             </a:r>
             <a:endParaRPr lang="ru-RU" dirty="0"/>
           </a:p>
@@ -5710,7 +5632,7 @@
       </p:sp>
       <p:pic>
         <p:nvPicPr>
-          <p:cNvPr id="6147" name="Picture 3"/>
+          <p:cNvPr id="5122" name="Picture 2"/>
           <p:cNvPicPr>
             <a:picLocks noChangeAspect="1" noChangeArrowheads="1"/>
           </p:cNvPicPr>
@@ -5725,8 +5647,8 @@
         </p:blipFill>
         <p:spPr bwMode="auto">
           <a:xfrm>
-            <a:off x="1285852" y="3786190"/>
-            <a:ext cx="6521450" cy="2108200"/>
+            <a:off x="1500166" y="4286256"/>
+            <a:ext cx="6394450" cy="1689100"/>
           </a:xfrm>
           <a:prstGeom prst="rect">
             <a:avLst/>
@@ -5870,7 +5792,7 @@
       </p:pic>
       <p:pic>
         <p:nvPicPr>
-          <p:cNvPr id="7172" name="Picture 4"/>
+          <p:cNvPr id="4098" name="Picture 2"/>
           <p:cNvPicPr>
             <a:picLocks noChangeAspect="1" noChangeArrowheads="1"/>
           </p:cNvPicPr>
@@ -5885,8 +5807,8 @@
         </p:blipFill>
         <p:spPr bwMode="auto">
           <a:xfrm>
-            <a:off x="1214414" y="4214818"/>
-            <a:ext cx="7358114" cy="2206875"/>
+            <a:off x="1142976" y="4429132"/>
+            <a:ext cx="7851804" cy="1848546"/>
           </a:xfrm>
           <a:prstGeom prst="rect">
             <a:avLst/>
@@ -7650,7 +7572,7 @@
                 <a:ea typeface="+mn-ea"/>
                 <a:cs typeface="+mn-cs"/>
               </a:rPr>
-              <a:t>выполнении частых автоматизированных сборок проекта для скорейшего выявления и решения интеграционных проблем.</a:t>
+              <a:t>частых автоматизированных сборок проекта для скорейшего выявления и решения интеграционных проблем.</a:t>
             </a:r>
             <a:endParaRPr kumimoji="0" lang="ru-RU" sz="2000" b="0" i="0" u="none" strike="noStrike" kern="1200" cap="none" spc="0" normalizeH="0" baseline="0" noProof="0" dirty="0">
               <a:ln>
@@ -8079,11 +8001,7 @@
             </a:r>
             <a:r>
               <a:rPr lang="ru-RU" sz="2000" dirty="0" smtClean="0"/>
-              <a:t> </a:t>
-            </a:r>
-            <a:r>
-              <a:rPr lang="ru-RU" sz="2000" dirty="0" smtClean="0"/>
-              <a:t>используют</a:t>
+              <a:t> используют</a:t>
             </a:r>
             <a:r>
               <a:rPr lang="en-US" sz="2000" dirty="0" smtClean="0"/>
@@ -8091,11 +8009,7 @@
             </a:r>
             <a:r>
               <a:rPr lang="ru-RU" sz="2000" dirty="0" smtClean="0"/>
-              <a:t>API </a:t>
-            </a:r>
-            <a:r>
-              <a:rPr lang="ru-RU" sz="2000" dirty="0" smtClean="0"/>
-              <a:t>для взаимодействия с сервером и для интеграции друг с другом, поэтому </a:t>
+              <a:t>API для взаимодействия с сервером и для интеграции друг с другом, поэтому </a:t>
             </a:r>
             <a:r>
               <a:rPr lang="ru-RU" sz="2000" dirty="0" err="1" smtClean="0"/>
@@ -8141,7 +8055,7 @@
             <a:pPr algn="just"/>
             <a:r>
               <a:rPr lang="ru-RU" dirty="0" smtClean="0"/>
-              <a:t>REST представляет собой согласованный набор ограничений, учитываемых при проектировании распределенной гипермедиа-системы. В нашем случая это приводит к повышению производительности и упрощению архитектуры. Компоненты в REST взаимодействуют наподобие взаимодействия клиентов и серверов во Всемирной паутине. REST является альтернативой RPC.</a:t>
+              <a:t>	REST представляет собой согласованный набор ограничений, учитываемых при проектировании распределенной гипермедиа-системы. В нашем случая это приводит к повышению производительности и упрощению архитектуры. Компоненты в REST взаимодействуют наподобие взаимодействия клиентов и серверов во Всемирной паутине. REST является альтернативой RPC.</a:t>
             </a:r>
             <a:endParaRPr lang="ru-RU" dirty="0"/>
           </a:p>

</xml_diff>